<commit_message>
major edits so far
</commit_message>
<xml_diff>
--- a/public/architecture_creator/template-placeholder.pptx
+++ b/public/architecture_creator/template-placeholder.pptx
@@ -261,7 +261,7 @@
           <a:p>
             <a:fld id="{5FC243EB-A3B3-1F41-B77A-665553D1D443}" type="datetimeFigureOut">
               <a:rPr lang="en-US" smtClean="0"/>
-              <a:t>9/5/19</a:t>
+              <a:t>9/6/19</a:t>
             </a:fld>
             <a:endParaRPr lang="en-US"/>
           </a:p>
@@ -459,7 +459,7 @@
           <a:p>
             <a:fld id="{5FC243EB-A3B3-1F41-B77A-665553D1D443}" type="datetimeFigureOut">
               <a:rPr lang="en-US" smtClean="0"/>
-              <a:t>9/5/19</a:t>
+              <a:t>9/6/19</a:t>
             </a:fld>
             <a:endParaRPr lang="en-US"/>
           </a:p>
@@ -667,7 +667,7 @@
           <a:p>
             <a:fld id="{5FC243EB-A3B3-1F41-B77A-665553D1D443}" type="datetimeFigureOut">
               <a:rPr lang="en-US" smtClean="0"/>
-              <a:t>9/5/19</a:t>
+              <a:t>9/6/19</a:t>
             </a:fld>
             <a:endParaRPr lang="en-US"/>
           </a:p>
@@ -865,7 +865,7 @@
           <a:p>
             <a:fld id="{5FC243EB-A3B3-1F41-B77A-665553D1D443}" type="datetimeFigureOut">
               <a:rPr lang="en-US" smtClean="0"/>
-              <a:t>9/5/19</a:t>
+              <a:t>9/6/19</a:t>
             </a:fld>
             <a:endParaRPr lang="en-US"/>
           </a:p>
@@ -1140,7 +1140,7 @@
           <a:p>
             <a:fld id="{5FC243EB-A3B3-1F41-B77A-665553D1D443}" type="datetimeFigureOut">
               <a:rPr lang="en-US" smtClean="0"/>
-              <a:t>9/5/19</a:t>
+              <a:t>9/6/19</a:t>
             </a:fld>
             <a:endParaRPr lang="en-US"/>
           </a:p>
@@ -1405,7 +1405,7 @@
           <a:p>
             <a:fld id="{5FC243EB-A3B3-1F41-B77A-665553D1D443}" type="datetimeFigureOut">
               <a:rPr lang="en-US" smtClean="0"/>
-              <a:t>9/5/19</a:t>
+              <a:t>9/6/19</a:t>
             </a:fld>
             <a:endParaRPr lang="en-US"/>
           </a:p>
@@ -1817,7 +1817,7 @@
           <a:p>
             <a:fld id="{5FC243EB-A3B3-1F41-B77A-665553D1D443}" type="datetimeFigureOut">
               <a:rPr lang="en-US" smtClean="0"/>
-              <a:t>9/5/19</a:t>
+              <a:t>9/6/19</a:t>
             </a:fld>
             <a:endParaRPr lang="en-US"/>
           </a:p>
@@ -1958,7 +1958,7 @@
           <a:p>
             <a:fld id="{5FC243EB-A3B3-1F41-B77A-665553D1D443}" type="datetimeFigureOut">
               <a:rPr lang="en-US" smtClean="0"/>
-              <a:t>9/5/19</a:t>
+              <a:t>9/6/19</a:t>
             </a:fld>
             <a:endParaRPr lang="en-US"/>
           </a:p>
@@ -2071,7 +2071,7 @@
           <a:p>
             <a:fld id="{5FC243EB-A3B3-1F41-B77A-665553D1D443}" type="datetimeFigureOut">
               <a:rPr lang="en-US" smtClean="0"/>
-              <a:t>9/5/19</a:t>
+              <a:t>9/6/19</a:t>
             </a:fld>
             <a:endParaRPr lang="en-US"/>
           </a:p>
@@ -2382,7 +2382,7 @@
           <a:p>
             <a:fld id="{5FC243EB-A3B3-1F41-B77A-665553D1D443}" type="datetimeFigureOut">
               <a:rPr lang="en-US" smtClean="0"/>
-              <a:t>9/5/19</a:t>
+              <a:t>9/6/19</a:t>
             </a:fld>
             <a:endParaRPr lang="en-US"/>
           </a:p>
@@ -2670,7 +2670,7 @@
           <a:p>
             <a:fld id="{5FC243EB-A3B3-1F41-B77A-665553D1D443}" type="datetimeFigureOut">
               <a:rPr lang="en-US" smtClean="0"/>
-              <a:t>9/5/19</a:t>
+              <a:t>9/6/19</a:t>
             </a:fld>
             <a:endParaRPr lang="en-US"/>
           </a:p>
@@ -2911,7 +2911,7 @@
           <a:p>
             <a:fld id="{5FC243EB-A3B3-1F41-B77A-665553D1D443}" type="datetimeFigureOut">
               <a:rPr lang="en-US" smtClean="0"/>
-              <a:t>9/5/19</a:t>
+              <a:t>9/6/19</a:t>
             </a:fld>
             <a:endParaRPr lang="en-US"/>
           </a:p>
@@ -3495,7 +3495,7 @@
         </p:nvSpPr>
         <p:spPr>
           <a:xfrm>
-            <a:off x="5074268" y="1305561"/>
+            <a:off x="5074268" y="2644503"/>
             <a:ext cx="2123439" cy="2123439"/>
           </a:xfrm>
           <a:prstGeom prst="ellipse">
@@ -3550,7 +3550,7 @@
         </p:nvSpPr>
         <p:spPr>
           <a:xfrm>
-            <a:off x="312683" y="228491"/>
+            <a:off x="312683" y="-115"/>
             <a:ext cx="10515600" cy="633358"/>
           </a:xfrm>
         </p:spPr>
@@ -3592,7 +3592,7 @@
         </p:blipFill>
         <p:spPr>
           <a:xfrm>
-            <a:off x="5455267" y="1787274"/>
+            <a:off x="5455267" y="3126216"/>
             <a:ext cx="1402080" cy="1402080"/>
           </a:xfrm>
           <a:prstGeom prst="rect">
@@ -3614,7 +3614,7 @@
         </p:nvSpPr>
         <p:spPr>
           <a:xfrm rot="5400000">
-            <a:off x="5891605" y="994701"/>
+            <a:off x="5891605" y="2333643"/>
             <a:ext cx="492443" cy="1240221"/>
           </a:xfrm>
           <a:prstGeom prst="rect">
@@ -3655,7 +3655,7 @@
         </p:nvSpPr>
         <p:spPr>
           <a:xfrm>
-            <a:off x="1343746" y="986149"/>
+            <a:off x="1343746" y="681347"/>
             <a:ext cx="1584960" cy="369332"/>
           </a:xfrm>
           <a:prstGeom prst="rect">
@@ -3691,7 +3691,7 @@
         </p:nvSpPr>
         <p:spPr>
           <a:xfrm>
-            <a:off x="312683" y="1306191"/>
+            <a:off x="312683" y="1001389"/>
             <a:ext cx="3649717" cy="5399409"/>
           </a:xfrm>
           <a:prstGeom prst="rect">
@@ -3738,7 +3738,7 @@
         </p:nvSpPr>
         <p:spPr>
           <a:xfrm>
-            <a:off x="527005" y="1450811"/>
+            <a:off x="527005" y="1146009"/>
             <a:ext cx="3241040" cy="936788"/>
           </a:xfrm>
           <a:prstGeom prst="roundRect">
@@ -3790,7 +3790,7 @@
         </p:nvSpPr>
         <p:spPr>
           <a:xfrm>
-            <a:off x="527005" y="2495531"/>
+            <a:off x="527005" y="2190729"/>
             <a:ext cx="3241040" cy="936788"/>
           </a:xfrm>
           <a:prstGeom prst="roundRect">
@@ -3842,7 +3842,7 @@
         </p:nvSpPr>
         <p:spPr>
           <a:xfrm>
-            <a:off x="515706" y="3540251"/>
+            <a:off x="515706" y="3235449"/>
             <a:ext cx="3241040" cy="936788"/>
           </a:xfrm>
           <a:prstGeom prst="roundRect">
@@ -3894,7 +3894,7 @@
         </p:nvSpPr>
         <p:spPr>
           <a:xfrm>
-            <a:off x="527005" y="4584971"/>
+            <a:off x="527005" y="4280169"/>
             <a:ext cx="3241040" cy="936788"/>
           </a:xfrm>
           <a:prstGeom prst="roundRect">
@@ -3946,7 +3946,7 @@
         </p:nvSpPr>
         <p:spPr>
           <a:xfrm>
-            <a:off x="527005" y="5629690"/>
+            <a:off x="527005" y="5324888"/>
             <a:ext cx="3241040" cy="936788"/>
           </a:xfrm>
           <a:prstGeom prst="roundRect">
@@ -3998,7 +3998,7 @@
         </p:nvSpPr>
         <p:spPr>
           <a:xfrm>
-            <a:off x="598125" y="1675523"/>
+            <a:off x="598125" y="1370721"/>
             <a:ext cx="1240835" cy="553998"/>
           </a:xfrm>
           <a:prstGeom prst="rect">
@@ -4055,7 +4055,7 @@
         </p:nvSpPr>
         <p:spPr>
           <a:xfrm>
-            <a:off x="598124" y="2831941"/>
+            <a:off x="598124" y="2527139"/>
             <a:ext cx="1240835" cy="246221"/>
           </a:xfrm>
           <a:prstGeom prst="rect">
@@ -4098,7 +4098,7 @@
         </p:nvSpPr>
         <p:spPr>
           <a:xfrm>
-            <a:off x="598124" y="3876661"/>
+            <a:off x="598124" y="3571859"/>
             <a:ext cx="1240835" cy="246221"/>
           </a:xfrm>
           <a:prstGeom prst="rect">
@@ -4141,7 +4141,7 @@
         </p:nvSpPr>
         <p:spPr>
           <a:xfrm>
-            <a:off x="598124" y="4915381"/>
+            <a:off x="598124" y="4610579"/>
             <a:ext cx="1240835" cy="246221"/>
           </a:xfrm>
           <a:prstGeom prst="rect">
@@ -4184,7 +4184,7 @@
         </p:nvSpPr>
         <p:spPr>
           <a:xfrm>
-            <a:off x="598123" y="5898029"/>
+            <a:off x="598123" y="5593227"/>
             <a:ext cx="1240835" cy="400110"/>
           </a:xfrm>
           <a:prstGeom prst="rect">
@@ -4241,8 +4241,8 @@
         </p:nvSpPr>
         <p:spPr>
           <a:xfrm>
-            <a:off x="9148990" y="976799"/>
-            <a:ext cx="1879421" cy="369332"/>
+            <a:off x="8281150" y="671997"/>
+            <a:ext cx="3666259" cy="369332"/>
           </a:xfrm>
           <a:prstGeom prst="rect">
             <a:avLst/>
@@ -4258,7 +4258,7 @@
             <a:pPr algn="ctr"/>
             <a:r>
               <a:rPr lang="en-US" dirty="0"/>
-              <a:t>Core Applications</a:t>
+              <a:t>End User and IT Applications</a:t>
             </a:r>
           </a:p>
         </p:txBody>
@@ -4277,8 +4277,8 @@
         </p:nvSpPr>
         <p:spPr>
           <a:xfrm>
-            <a:off x="8289421" y="1306192"/>
-            <a:ext cx="3649717" cy="2270854"/>
+            <a:off x="8289421" y="1001389"/>
+            <a:ext cx="3649717" cy="5399406"/>
           </a:xfrm>
           <a:prstGeom prst="rect">
             <a:avLst/>
@@ -4324,7 +4324,7 @@
         </p:nvSpPr>
         <p:spPr>
           <a:xfrm>
-            <a:off x="8503743" y="1450811"/>
+            <a:off x="8503743" y="1146009"/>
             <a:ext cx="3241040" cy="936788"/>
           </a:xfrm>
           <a:prstGeom prst="roundRect">
@@ -4376,7 +4376,7 @@
         </p:nvSpPr>
         <p:spPr>
           <a:xfrm>
-            <a:off x="8503743" y="2495531"/>
+            <a:off x="8503743" y="2190729"/>
             <a:ext cx="3241040" cy="936788"/>
           </a:xfrm>
           <a:prstGeom prst="roundRect">
@@ -4428,7 +4428,7 @@
         </p:nvSpPr>
         <p:spPr>
           <a:xfrm>
-            <a:off x="10647146" y="1799824"/>
+            <a:off x="10647146" y="1495022"/>
             <a:ext cx="1240835" cy="246221"/>
           </a:xfrm>
           <a:prstGeom prst="rect">
@@ -4471,7 +4471,7 @@
         </p:nvSpPr>
         <p:spPr>
           <a:xfrm>
-            <a:off x="10647146" y="2831941"/>
+            <a:off x="10647146" y="2527139"/>
             <a:ext cx="1240835" cy="246221"/>
           </a:xfrm>
           <a:prstGeom prst="rect">
@@ -4514,7 +4514,7 @@
         </p:nvSpPr>
         <p:spPr>
           <a:xfrm>
-            <a:off x="9296221" y="4120309"/>
+            <a:off x="9296221" y="3815507"/>
             <a:ext cx="1584960" cy="369332"/>
           </a:xfrm>
           <a:prstGeom prst="rect">
@@ -4538,10 +4538,10 @@
       </p:sp>
       <p:sp>
         <p:nvSpPr>
-          <p:cNvPr id="30" name="Rectangle 29">
-            <a:extLst>
-              <a:ext uri="{FF2B5EF4-FFF2-40B4-BE49-F238E27FC236}">
-                <a16:creationId xmlns:a16="http://schemas.microsoft.com/office/drawing/2014/main" id="{07D0CE89-33BD-064F-A188-08798711B01A}"/>
+          <p:cNvPr id="31" name="Rounded Rectangle 30">
+            <a:extLst>
+              <a:ext uri="{FF2B5EF4-FFF2-40B4-BE49-F238E27FC236}">
+                <a16:creationId xmlns:a16="http://schemas.microsoft.com/office/drawing/2014/main" id="{876BF9D0-A8AE-7A4C-A727-B727D9878708}"/>
               </a:ext>
             </a:extLst>
           </p:cNvPr>
@@ -4550,54 +4550,7 @@
         </p:nvSpPr>
         <p:spPr>
           <a:xfrm>
-            <a:off x="8289421" y="4440352"/>
-            <a:ext cx="3649717" cy="2270854"/>
-          </a:xfrm>
-          <a:prstGeom prst="rect">
-            <a:avLst/>
-          </a:prstGeom>
-          <a:noFill/>
-        </p:spPr>
-        <p:style>
-          <a:lnRef idx="2">
-            <a:schemeClr val="accent1">
-              <a:shade val="50000"/>
-            </a:schemeClr>
-          </a:lnRef>
-          <a:fillRef idx="1">
-            <a:schemeClr val="accent1"/>
-          </a:fillRef>
-          <a:effectRef idx="0">
-            <a:schemeClr val="accent1"/>
-          </a:effectRef>
-          <a:fontRef idx="minor">
-            <a:schemeClr val="lt1"/>
-          </a:fontRef>
-        </p:style>
-        <p:txBody>
-          <a:bodyPr rtlCol="0" anchor="ctr"/>
-          <a:lstStyle/>
-          <a:p>
-            <a:pPr algn="ctr"/>
-            <a:endParaRPr lang="en-US"/>
-          </a:p>
-        </p:txBody>
-      </p:sp>
-      <p:sp>
-        <p:nvSpPr>
-          <p:cNvPr id="31" name="Rounded Rectangle 30">
-            <a:extLst>
-              <a:ext uri="{FF2B5EF4-FFF2-40B4-BE49-F238E27FC236}">
-                <a16:creationId xmlns:a16="http://schemas.microsoft.com/office/drawing/2014/main" id="{876BF9D0-A8AE-7A4C-A727-B727D9878708}"/>
-              </a:ext>
-            </a:extLst>
-          </p:cNvPr>
-          <p:cNvSpPr/>
-          <p:nvPr/>
-        </p:nvSpPr>
-        <p:spPr>
-          <a:xfrm>
-            <a:off x="8503743" y="4584971"/>
+            <a:off x="8503743" y="4280169"/>
             <a:ext cx="3241040" cy="936788"/>
           </a:xfrm>
           <a:prstGeom prst="roundRect">
@@ -4649,16 +4602,16 @@
         </p:nvSpPr>
         <p:spPr>
           <a:xfrm>
-            <a:off x="8503743" y="5629691"/>
+            <a:off x="8503743" y="5324889"/>
             <a:ext cx="3241040" cy="936788"/>
           </a:xfrm>
           <a:prstGeom prst="roundRect">
             <a:avLst/>
           </a:prstGeom>
           <a:solidFill>
-            <a:schemeClr val="accent6">
-              <a:lumMod val="40000"/>
-              <a:lumOff val="60000"/>
+            <a:schemeClr val="accent2">
+              <a:lumMod val="20000"/>
+              <a:lumOff val="80000"/>
             </a:schemeClr>
           </a:solidFill>
         </p:spPr>
@@ -4701,7 +4654,7 @@
         </p:nvSpPr>
         <p:spPr>
           <a:xfrm>
-            <a:off x="10647146" y="4933984"/>
+            <a:off x="10647146" y="4629182"/>
             <a:ext cx="1240835" cy="246221"/>
           </a:xfrm>
           <a:prstGeom prst="rect">
@@ -4744,7 +4697,7 @@
         </p:nvSpPr>
         <p:spPr>
           <a:xfrm>
-            <a:off x="10647146" y="5966101"/>
+            <a:off x="10647146" y="5661299"/>
             <a:ext cx="1240835" cy="246221"/>
           </a:xfrm>
           <a:prstGeom prst="rect">
@@ -4768,99 +4721,7 @@
                 </a:solidFill>
                 <a:latin typeface="Sharp Grotesk DB Book 22" panose="020B0505050702030204" pitchFamily="34" charset="77"/>
               </a:rPr>
-              <a:t>Backup</a:t>
-            </a:r>
-          </a:p>
-        </p:txBody>
-      </p:sp>
-      <p:sp>
-        <p:nvSpPr>
-          <p:cNvPr id="47" name="Rounded Rectangle 46">
-            <a:extLst>
-              <a:ext uri="{FF2B5EF4-FFF2-40B4-BE49-F238E27FC236}">
-                <a16:creationId xmlns:a16="http://schemas.microsoft.com/office/drawing/2014/main" id="{2E6C0C02-5CF4-C548-954F-EEFA42957D46}"/>
-              </a:ext>
-            </a:extLst>
-          </p:cNvPr>
-          <p:cNvSpPr/>
-          <p:nvPr/>
-        </p:nvSpPr>
-        <p:spPr>
-          <a:xfrm>
-            <a:off x="5334874" y="4692199"/>
-            <a:ext cx="1662209" cy="1659119"/>
-          </a:xfrm>
-          <a:prstGeom prst="roundRect">
-            <a:avLst/>
-          </a:prstGeom>
-          <a:solidFill>
-            <a:srgbClr val="CFCDCD"/>
-          </a:solidFill>
-        </p:spPr>
-        <p:style>
-          <a:lnRef idx="2">
-            <a:schemeClr val="accent1">
-              <a:shade val="50000"/>
-            </a:schemeClr>
-          </a:lnRef>
-          <a:fillRef idx="1">
-            <a:schemeClr val="accent1"/>
-          </a:fillRef>
-          <a:effectRef idx="0">
-            <a:schemeClr val="accent1"/>
-          </a:effectRef>
-          <a:fontRef idx="minor">
-            <a:schemeClr val="lt1"/>
-          </a:fontRef>
-        </p:style>
-        <p:txBody>
-          <a:bodyPr rtlCol="0" anchor="ctr"/>
-          <a:lstStyle/>
-          <a:p>
-            <a:pPr algn="ctr"/>
-            <a:endParaRPr lang="en-US" dirty="0"/>
-          </a:p>
-        </p:txBody>
-      </p:sp>
-      <p:sp>
-        <p:nvSpPr>
-          <p:cNvPr id="48" name="TextBox 47">
-            <a:extLst>
-              <a:ext uri="{FF2B5EF4-FFF2-40B4-BE49-F238E27FC236}">
-                <a16:creationId xmlns:a16="http://schemas.microsoft.com/office/drawing/2014/main" id="{5BDE4ADD-48E3-274D-AE54-95B8F5609416}"/>
-              </a:ext>
-            </a:extLst>
-          </p:cNvPr>
-          <p:cNvSpPr txBox="1"/>
-          <p:nvPr/>
-        </p:nvSpPr>
-        <p:spPr>
-          <a:xfrm>
-            <a:off x="5550815" y="4751460"/>
-            <a:ext cx="1240835" cy="400110"/>
-          </a:xfrm>
-          <a:prstGeom prst="rect">
-            <a:avLst/>
-          </a:prstGeom>
-          <a:solidFill>
-            <a:srgbClr val="CFCDCD"/>
-          </a:solidFill>
-        </p:spPr>
-        <p:txBody>
-          <a:bodyPr vert="horz" wrap="square" rtlCol="0">
-            <a:spAutoFit/>
-          </a:bodyPr>
-          <a:lstStyle/>
-          <a:p>
-            <a:pPr algn="ctr"/>
-            <a:r>
-              <a:rPr lang="en-US" sz="1000" dirty="0">
-                <a:solidFill>
-                  <a:srgbClr val="003399"/>
-                </a:solidFill>
-                <a:latin typeface="Sharp Grotesk DB Book 22" panose="020B0505050702030204" pitchFamily="34" charset="77"/>
-              </a:rPr>
-              <a:t>Workflow Application</a:t>
+              <a:t>Workflow</a:t>
             </a:r>
           </a:p>
         </p:txBody>
@@ -4879,7 +4740,7 @@
         </p:nvCxnSpPr>
         <p:spPr>
           <a:xfrm flipH="1">
-            <a:off x="4618648" y="2377790"/>
+            <a:off x="4618648" y="3705846"/>
             <a:ext cx="460660" cy="0"/>
           </a:xfrm>
           <a:prstGeom prst="line">
@@ -4923,7 +4784,7 @@
         </p:nvCxnSpPr>
         <p:spPr>
           <a:xfrm flipV="1">
-            <a:off x="4608866" y="1847740"/>
+            <a:off x="4608866" y="1542938"/>
             <a:ext cx="0" cy="4250344"/>
           </a:xfrm>
           <a:prstGeom prst="line">
@@ -4968,7 +4829,7 @@
         </p:nvCxnSpPr>
         <p:spPr>
           <a:xfrm flipH="1">
-            <a:off x="7197707" y="2371526"/>
+            <a:off x="7197707" y="3699582"/>
             <a:ext cx="460660" cy="0"/>
           </a:xfrm>
           <a:prstGeom prst="line">
@@ -5013,7 +4874,7 @@
         </p:nvCxnSpPr>
         <p:spPr>
           <a:xfrm flipV="1">
-            <a:off x="7666638" y="1847740"/>
+            <a:off x="7666638" y="1542938"/>
             <a:ext cx="0" cy="4250344"/>
           </a:xfrm>
           <a:prstGeom prst="line">
@@ -5056,7 +4917,7 @@
         </p:nvCxnSpPr>
         <p:spPr>
           <a:xfrm flipH="1">
-            <a:off x="3962400" y="1850523"/>
+            <a:off x="3962400" y="1545721"/>
             <a:ext cx="646466" cy="0"/>
           </a:xfrm>
           <a:prstGeom prst="line">
@@ -5101,7 +4962,7 @@
         </p:nvCxnSpPr>
         <p:spPr>
           <a:xfrm flipH="1">
-            <a:off x="3972182" y="2950498"/>
+            <a:off x="3972182" y="2645696"/>
             <a:ext cx="646466" cy="0"/>
           </a:xfrm>
           <a:prstGeom prst="line">
@@ -5146,7 +5007,7 @@
         </p:nvCxnSpPr>
         <p:spPr>
           <a:xfrm flipH="1">
-            <a:off x="3972182" y="4008645"/>
+            <a:off x="3972182" y="3703843"/>
             <a:ext cx="646466" cy="0"/>
           </a:xfrm>
           <a:prstGeom prst="line">
@@ -5191,7 +5052,7 @@
         </p:nvCxnSpPr>
         <p:spPr>
           <a:xfrm flipH="1">
-            <a:off x="3972182" y="5038491"/>
+            <a:off x="3972182" y="4733689"/>
             <a:ext cx="646466" cy="0"/>
           </a:xfrm>
           <a:prstGeom prst="line">
@@ -5236,7 +5097,7 @@
         </p:nvCxnSpPr>
         <p:spPr>
           <a:xfrm flipH="1">
-            <a:off x="3972182" y="6096865"/>
+            <a:off x="3972182" y="5792063"/>
             <a:ext cx="646466" cy="0"/>
           </a:xfrm>
           <a:prstGeom prst="line">
@@ -5281,7 +5142,7 @@
         </p:nvCxnSpPr>
         <p:spPr>
           <a:xfrm flipH="1">
-            <a:off x="7666638" y="1847740"/>
+            <a:off x="7666638" y="1542938"/>
             <a:ext cx="622783" cy="0"/>
           </a:xfrm>
           <a:prstGeom prst="line">
@@ -5326,7 +5187,7 @@
         </p:nvCxnSpPr>
         <p:spPr>
           <a:xfrm flipH="1">
-            <a:off x="7672571" y="2964183"/>
+            <a:off x="7672571" y="2659381"/>
             <a:ext cx="622783" cy="0"/>
           </a:xfrm>
           <a:prstGeom prst="line">
@@ -5371,7 +5232,7 @@
         </p:nvCxnSpPr>
         <p:spPr>
           <a:xfrm flipH="1">
-            <a:off x="7658367" y="5048376"/>
+            <a:off x="7658367" y="4743574"/>
             <a:ext cx="622783" cy="0"/>
           </a:xfrm>
           <a:prstGeom prst="line">
@@ -5416,7 +5277,7 @@
         </p:nvCxnSpPr>
         <p:spPr>
           <a:xfrm flipH="1">
-            <a:off x="7666540" y="6096865"/>
+            <a:off x="7666540" y="5792063"/>
             <a:ext cx="622783" cy="0"/>
           </a:xfrm>
           <a:prstGeom prst="line">
@@ -5447,10 +5308,10 @@
       </p:cxnSp>
       <p:sp>
         <p:nvSpPr>
-          <p:cNvPr id="82" name="Up-down Arrow 81">
-            <a:extLst>
-              <a:ext uri="{FF2B5EF4-FFF2-40B4-BE49-F238E27FC236}">
-                <a16:creationId xmlns:a16="http://schemas.microsoft.com/office/drawing/2014/main" id="{832775B8-9F71-4A46-ABCD-8207D3B4BBA6}"/>
+          <p:cNvPr id="46" name="Rounded Rectangle 45">
+            <a:extLst>
+              <a:ext uri="{FF2B5EF4-FFF2-40B4-BE49-F238E27FC236}">
+                <a16:creationId xmlns:a16="http://schemas.microsoft.com/office/drawing/2014/main" id="{4BA01C7A-306A-684F-8649-9DD59039F55B}"/>
               </a:ext>
             </a:extLst>
           </p:cNvPr>
@@ -5459,18 +5320,18 @@
         </p:nvSpPr>
         <p:spPr>
           <a:xfrm>
-            <a:off x="5958764" y="3571414"/>
-            <a:ext cx="395086" cy="1007925"/>
-          </a:xfrm>
-          <a:prstGeom prst="upDownArrow">
+            <a:off x="8503743" y="3235449"/>
+            <a:ext cx="3241040" cy="936788"/>
+          </a:xfrm>
+          <a:prstGeom prst="roundRect">
             <a:avLst/>
           </a:prstGeom>
           <a:solidFill>
-            <a:srgbClr val="0061FF"/>
+            <a:schemeClr val="accent4">
+              <a:lumMod val="20000"/>
+              <a:lumOff val="80000"/>
+            </a:schemeClr>
           </a:solidFill>
-          <a:ln>
-            <a:noFill/>
-          </a:ln>
         </p:spPr>
         <p:style>
           <a:lnRef idx="2">
@@ -5497,6 +5358,94 @@
           </a:p>
         </p:txBody>
       </p:sp>
+      <p:sp>
+        <p:nvSpPr>
+          <p:cNvPr id="49" name="TextBox 48">
+            <a:extLst>
+              <a:ext uri="{FF2B5EF4-FFF2-40B4-BE49-F238E27FC236}">
+                <a16:creationId xmlns:a16="http://schemas.microsoft.com/office/drawing/2014/main" id="{90F13030-7855-4C41-9759-6357865D4568}"/>
+              </a:ext>
+            </a:extLst>
+          </p:cNvPr>
+          <p:cNvSpPr txBox="1"/>
+          <p:nvPr/>
+        </p:nvSpPr>
+        <p:spPr>
+          <a:xfrm>
+            <a:off x="10640930" y="3600419"/>
+            <a:ext cx="1240835" cy="246221"/>
+          </a:xfrm>
+          <a:prstGeom prst="rect">
+            <a:avLst/>
+          </a:prstGeom>
+          <a:noFill/>
+        </p:spPr>
+        <p:txBody>
+          <a:bodyPr vert="horz" wrap="square" rtlCol="0">
+            <a:spAutoFit/>
+          </a:bodyPr>
+          <a:lstStyle/>
+          <a:p>
+            <a:pPr algn="ctr"/>
+            <a:r>
+              <a:rPr lang="en-US" sz="1000" dirty="0">
+                <a:solidFill>
+                  <a:schemeClr val="bg2">
+                    <a:lumMod val="50000"/>
+                  </a:schemeClr>
+                </a:solidFill>
+                <a:latin typeface="Sharp Grotesk DB Book 22" panose="020B0505050702030204" pitchFamily="34" charset="77"/>
+              </a:rPr>
+              <a:t>Meetings</a:t>
+            </a:r>
+          </a:p>
+        </p:txBody>
+      </p:sp>
+      <p:cxnSp>
+        <p:nvCxnSpPr>
+          <p:cNvPr id="60" name="Straight Connector 59">
+            <a:extLst>
+              <a:ext uri="{FF2B5EF4-FFF2-40B4-BE49-F238E27FC236}">
+                <a16:creationId xmlns:a16="http://schemas.microsoft.com/office/drawing/2014/main" id="{99E3EC9B-0293-AF43-B10F-04D313F74E32}"/>
+              </a:ext>
+            </a:extLst>
+          </p:cNvPr>
+          <p:cNvCxnSpPr>
+            <a:cxnSpLocks/>
+          </p:cNvCxnSpPr>
+          <p:nvPr/>
+        </p:nvCxnSpPr>
+        <p:spPr>
+          <a:xfrm flipH="1">
+            <a:off x="7666540" y="3707110"/>
+            <a:ext cx="622783" cy="0"/>
+          </a:xfrm>
+          <a:prstGeom prst="line">
+            <a:avLst/>
+          </a:prstGeom>
+          <a:ln w="31750">
+            <a:solidFill>
+              <a:srgbClr val="003399"/>
+            </a:solidFill>
+            <a:headEnd type="triangle"/>
+            <a:tailEnd type="none"/>
+          </a:ln>
+        </p:spPr>
+        <p:style>
+          <a:lnRef idx="1">
+            <a:schemeClr val="accent1"/>
+          </a:lnRef>
+          <a:fillRef idx="0">
+            <a:schemeClr val="accent1"/>
+          </a:fillRef>
+          <a:effectRef idx="0">
+            <a:schemeClr val="accent1"/>
+          </a:effectRef>
+          <a:fontRef idx="minor">
+            <a:schemeClr val="tx1"/>
+          </a:fontRef>
+        </p:style>
+      </p:cxnSp>
     </p:spTree>
     <p:extLst>
       <p:ext uri="{BB962C8B-B14F-4D97-AF65-F5344CB8AC3E}">

</xml_diff>